<commit_message>
Made Database image more visible on paper
</commit_message>
<xml_diff>
--- a/powerTraces/allPowerTraces.pptx
+++ b/powerTraces/allPowerTraces.pptx
@@ -153,7 +153,7 @@
               </a:defRPr>
             </a:pPr>
             <a:r>
-              <a:rPr lang="en-US"/>
+              <a:rPr lang="en-US" sz="1800" dirty="0"/>
               <a:t>Database</a:t>
             </a:r>
           </a:p>
@@ -568,7 +568,7 @@
               <a:lstStyle/>
               <a:p>
                 <a:pPr>
-                  <a:defRPr sz="1000" b="0" i="0" u="none" strike="noStrike" kern="1200" baseline="0">
+                  <a:defRPr sz="1800" b="0" i="0" u="none" strike="noStrike" kern="1200" baseline="0">
                     <a:solidFill>
                       <a:schemeClr val="tx1">
                         <a:lumMod val="65000"/>
@@ -581,24 +581,24 @@
                   </a:defRPr>
                 </a:pPr>
                 <a:r>
-                  <a:rPr lang="en-US"/>
+                  <a:rPr lang="en-US" sz="1800"/>
                   <a:t>Time</a:t>
                 </a:r>
                 <a:r>
-                  <a:rPr lang="en-US" baseline="0"/>
+                  <a:rPr lang="en-US" sz="1800" baseline="0"/>
                   <a:t> (</a:t>
                 </a:r>
                 <a:r>
-                  <a:rPr lang="en-US" sz="1000" b="0" i="0" u="none" strike="noStrike" baseline="0">
+                  <a:rPr lang="en-US" sz="1800" b="0" i="0" u="none" strike="noStrike" baseline="0">
                     <a:effectLst/>
                   </a:rPr>
                   <a:t>µs</a:t>
                 </a:r>
                 <a:r>
-                  <a:rPr lang="en-US" baseline="0"/>
+                  <a:rPr lang="en-US" sz="1800" baseline="0"/>
                   <a:t>)</a:t>
                 </a:r>
-                <a:endParaRPr lang="en-US"/>
+                <a:endParaRPr lang="en-US" sz="1800"/>
               </a:p>
             </c:rich>
           </c:tx>
@@ -615,7 +615,7 @@
             <a:lstStyle/>
             <a:p>
               <a:pPr>
-                <a:defRPr sz="1000" b="0" i="0" u="none" strike="noStrike" kern="1200" baseline="0">
+                <a:defRPr sz="1800" b="0" i="0" u="none" strike="noStrike" kern="1200" baseline="0">
                   <a:solidFill>
                     <a:schemeClr val="tx1">
                       <a:lumMod val="65000"/>
@@ -653,7 +653,7 @@
           <a:lstStyle/>
           <a:p>
             <a:pPr>
-              <a:defRPr sz="900" b="0" i="0" u="none" strike="noStrike" kern="1200" baseline="0">
+              <a:defRPr sz="1800" b="0" i="0" u="none" strike="noStrike" kern="1200" baseline="0">
                 <a:solidFill>
                   <a:schemeClr val="tx1">
                     <a:lumMod val="65000"/>
@@ -700,7 +700,7 @@
               <a:lstStyle/>
               <a:p>
                 <a:pPr>
-                  <a:defRPr sz="1000" b="0" i="0" u="none" strike="noStrike" kern="1200" baseline="0">
+                  <a:defRPr sz="1800" b="0" i="0" u="none" strike="noStrike" kern="1200" baseline="0">
                     <a:solidFill>
                       <a:schemeClr val="tx1">
                         <a:lumMod val="65000"/>
@@ -713,14 +713,14 @@
                   </a:defRPr>
                 </a:pPr>
                 <a:r>
-                  <a:rPr lang="en-US"/>
+                  <a:rPr lang="en-US" sz="1800"/>
                   <a:t>Average Power</a:t>
                 </a:r>
                 <a:r>
-                  <a:rPr lang="en-US" baseline="0"/>
+                  <a:rPr lang="en-US" sz="1800" baseline="0"/>
                   <a:t> (W)</a:t>
                 </a:r>
-                <a:endParaRPr lang="en-US"/>
+                <a:endParaRPr lang="en-US" sz="1800"/>
               </a:p>
             </c:rich>
           </c:tx>
@@ -737,7 +737,7 @@
             <a:lstStyle/>
             <a:p>
               <a:pPr>
-                <a:defRPr sz="1000" b="0" i="0" u="none" strike="noStrike" kern="1200" baseline="0">
+                <a:defRPr sz="1800" b="0" i="0" u="none" strike="noStrike" kern="1200" baseline="0">
                   <a:solidFill>
                     <a:schemeClr val="tx1">
                       <a:lumMod val="65000"/>
@@ -775,7 +775,7 @@
           <a:lstStyle/>
           <a:p>
             <a:pPr>
-              <a:defRPr sz="900" b="0" i="0" u="none" strike="noStrike" kern="1200" baseline="0">
+              <a:defRPr sz="1800" b="0" i="0" u="none" strike="noStrike" kern="1200" baseline="0">
                 <a:solidFill>
                   <a:schemeClr val="tx1">
                     <a:lumMod val="65000"/>
@@ -30713,14 +30713,14 @@
           <p:nvPr>
             <p:extLst>
               <p:ext uri="{D42A27DB-BD31-4B8C-83A1-F6EECF244321}">
-                <p14:modId xmlns:p14="http://schemas.microsoft.com/office/powerpoint/2010/main" val="2567728677"/>
+                <p14:modId xmlns:p14="http://schemas.microsoft.com/office/powerpoint/2010/main" val="3642999464"/>
               </p:ext>
             </p:extLst>
           </p:nvPr>
         </p:nvGraphicFramePr>
         <p:xfrm>
-          <a:off x="1901300" y="1075308"/>
-          <a:ext cx="7845640" cy="4707384"/>
+          <a:off x="1475172" y="249685"/>
+          <a:ext cx="9772836" cy="5863702"/>
         </p:xfrm>
         <a:graphic>
           <a:graphicData uri="http://schemas.openxmlformats.org/drawingml/2006/chart">
@@ -30742,8 +30742,8 @@
         </p:nvSpPr>
         <p:spPr>
           <a:xfrm>
-            <a:off x="275207" y="5459766"/>
-            <a:ext cx="2169853" cy="830997"/>
+            <a:off x="292962" y="5868138"/>
+            <a:ext cx="3879543" cy="369332"/>
           </a:xfrm>
           <a:prstGeom prst="rect">
             <a:avLst/>
@@ -30763,12 +30763,11 @@
           <a:p>
             <a:pPr algn="ctr"/>
             <a:r>
-              <a:rPr lang="en-US" sz="2400" dirty="0"/>
-              <a:t>result = a + CONSTANT_32</a:t>
-            </a:r>
-            <a:r>
-              <a:rPr lang="en-US" sz="1200" dirty="0"/>
-              <a:t>;</a:t>
+              <a:rPr lang="en-US" dirty="0">
+                <a:latin typeface="Courier New" panose="02070309020205020404" pitchFamily="49" charset="0"/>
+                <a:cs typeface="Courier New" panose="02070309020205020404" pitchFamily="49" charset="0"/>
+              </a:rPr>
+              <a:t>result = a + CONSTANT_32;</a:t>
             </a:r>
           </a:p>
         </p:txBody>
@@ -30784,31 +30783,36 @@
           </p:cNvPr>
           <p:cNvCxnSpPr>
             <a:cxnSpLocks/>
-            <a:stCxn id="5" idx="0"/>
           </p:cNvCxnSpPr>
           <p:nvPr/>
         </p:nvCxnSpPr>
         <p:spPr>
           <a:xfrm flipV="1">
-            <a:off x="1360134" y="3790765"/>
-            <a:ext cx="1249901" cy="1669001"/>
+            <a:off x="878889" y="3542190"/>
+            <a:ext cx="1660125" cy="2325948"/>
           </a:xfrm>
           <a:prstGeom prst="straightConnector1">
             <a:avLst/>
           </a:prstGeom>
-          <a:ln>
-            <a:tailEnd type="triangle"/>
+          <a:ln w="9525" cap="flat" cmpd="sng" algn="ctr">
+            <a:solidFill>
+              <a:schemeClr val="dk1"/>
+            </a:solidFill>
+            <a:prstDash val="dash"/>
+            <a:round/>
+            <a:headEnd type="none" w="med" len="med"/>
+            <a:tailEnd type="none" w="med" len="med"/>
           </a:ln>
         </p:spPr>
         <p:style>
-          <a:lnRef idx="1">
-            <a:schemeClr val="dk1"/>
+          <a:lnRef idx="0">
+            <a:scrgbClr r="0" g="0" b="0"/>
           </a:lnRef>
           <a:fillRef idx="0">
-            <a:schemeClr val="dk1"/>
+            <a:scrgbClr r="0" g="0" b="0"/>
           </a:fillRef>
           <a:effectRef idx="0">
-            <a:schemeClr val="dk1"/>
+            <a:scrgbClr r="0" g="0" b="0"/>
           </a:effectRef>
           <a:fontRef idx="minor">
             <a:schemeClr val="tx1"/>

</xml_diff>